<commit_message>
Lecture 10 - fixing errors
</commit_message>
<xml_diff>
--- a/2024/lecture_10.pptx
+++ b/2024/lecture_10.pptx
@@ -8281,7 +8281,7 @@
                 </a14:m>
                 <a:r>
                   <a:rPr/>
-                  <a:t> (intercept) = 10.79 (the value of sleep when all predictors are at 0)</a:t>
+                  <a:t> (intercept) = 8.57 (the value of sleep when all predictors are at 0)</a:t>
                 </a:r>
               </a:p>
               <a:p>
@@ -8344,7 +8344,7 @@
                 </a:r>
                 <a:r>
                   <a:rPr/>
-                  <a:t> &lt; 0.001, 95% CI [1.34, -2.97]</a:t>
+                  <a:t> &lt; .001, 95% CI [1.34, -2.97]</a:t>
                 </a:r>
               </a:p>
               <a:p>
@@ -8408,7 +8408,7 @@
                 </a14:m>
                 <a:r>
                   <a:rPr/>
-                  <a:t>) = 0.50, </a:t>
+                  <a:t>) = -0.50, </a:t>
                 </a:r>
                 <a:r>
                   <a:rPr i="1"/>
@@ -8416,7 +8416,7 @@
                 </a:r>
                 <a:r>
                   <a:rPr/>
-                  <a:t> = 0.132, 95% CI [-1.15, 0.15]</a:t>
+                  <a:t> = .132, 95% CI [-1.15, 0.15]</a:t>
                 </a:r>
               </a:p>
               <a:p>
@@ -8474,7 +8474,7 @@
                 </a14:m>
                 <a:r>
                   <a:rPr/>
-                  <a:t>) = 0.99, </a:t>
+                  <a:t>) = -0.99, </a:t>
                 </a:r>
                 <a:r>
                   <a:rPr i="1"/>
@@ -8482,7 +8482,7 @@
                 </a:r>
                 <a:r>
                   <a:rPr/>
-                  <a:t> &lt; 0.001, 95% CI [-1.71, -0.26]</a:t>
+                  <a:t> &lt; .001, 95% CI [-1.71, -0.26]</a:t>
                 </a:r>
               </a:p>
               <a:p>
@@ -9648,7 +9648,15 @@
                 <a:pPr lvl="0"/>
                 <a:r>
                   <a:rPr sz="2000"/>
-                  <a:t>Change in the outcome for each </a:t>
+                  <a:t>A </a:t>
+                </a:r>
+                <a:r>
+                  <a:rPr sz="2000" b="1"/>
+                  <a:t>standard deviation</a:t>
+                </a:r>
+                <a:r>
+                  <a:rPr sz="2000"/>
+                  <a:t> change in the outcome for each </a:t>
                 </a:r>
                 <a:r>
                   <a:rPr sz="2000" b="1"/>
@@ -9786,15 +9794,6 @@
             </a:r>
           </a:p>
           <a:p>
-            <a:pPr lvl="0" indent="0" marL="0">
-              <a:buNone/>
-            </a:pPr>
-            <a:r>
-              <a:rPr/>
-              <a:t>. . .</a:t>
-            </a:r>
-          </a:p>
-          <a:p>
             <a:pPr lvl="0"/>
             <a:r>
               <a:rPr/>
@@ -9812,6 +9811,186 @@
       </p:sp>
     </p:spTree>
   </p:cSld>
+  <p:timing>
+    <p:tnLst>
+      <p:par>
+        <p:cTn id="1" dur="indefinite" restart="never" nodeType="tmRoot">
+          <p:childTnLst>
+            <p:seq concurrent="1" nextAc="seek">
+              <p:cTn id="2" dur="indefinite" nodeType="mainSeq">
+                <p:childTnLst>
+                  <p:par>
+                    <p:cTn id="3" fill="hold">
+                      <p:stCondLst>
+                        <p:cond delay="indefinite"/>
+                      </p:stCondLst>
+                      <p:childTnLst>
+                        <p:par>
+                          <p:cTn id="4" fill="hold">
+                            <p:stCondLst>
+                              <p:cond delay="0"/>
+                            </p:stCondLst>
+                            <p:childTnLst>
+                              <p:par>
+                                <p:cTn id="5" presetID="1" presetClass="entr" presetSubtype="0" fill="hold" grpId="0" nodeType="clickEffect">
+                                  <p:stCondLst>
+                                    <p:cond delay="0"/>
+                                  </p:stCondLst>
+                                  <p:childTnLst>
+                                    <p:set>
+                                      <p:cBhvr>
+                                        <p:cTn id="6" dur="1" fill="hold">
+                                          <p:stCondLst>
+                                            <p:cond delay="0"/>
+                                          </p:stCondLst>
+                                        </p:cTn>
+                                        <p:tgtEl>
+                                          <p:spTgt spid="3">
+                                            <p:txEl>
+                                              <p:pRg st="3" end="3"/>
+                                            </p:txEl>
+                                          </p:spTgt>
+                                        </p:tgtEl>
+                                        <p:attrNameLst>
+                                          <p:attrName>style.visibility</p:attrName>
+                                        </p:attrNameLst>
+                                      </p:cBhvr>
+                                      <p:to>
+                                        <p:strVal val="visible"/>
+                                      </p:to>
+                                    </p:set>
+                                  </p:childTnLst>
+                                </p:cTn>
+                              </p:par>
+                            </p:childTnLst>
+                          </p:cTn>
+                        </p:par>
+                      </p:childTnLst>
+                    </p:cTn>
+                  </p:par>
+                  <p:par>
+                    <p:cTn id="7" fill="hold">
+                      <p:stCondLst>
+                        <p:cond delay="indefinite"/>
+                      </p:stCondLst>
+                      <p:childTnLst>
+                        <p:par>
+                          <p:cTn id="8" fill="hold">
+                            <p:stCondLst>
+                              <p:cond delay="0"/>
+                            </p:stCondLst>
+                            <p:childTnLst>
+                              <p:par>
+                                <p:cTn id="9" presetID="1" presetClass="entr" presetSubtype="0" fill="hold" grpId="0" nodeType="clickEffect">
+                                  <p:stCondLst>
+                                    <p:cond delay="0"/>
+                                  </p:stCondLst>
+                                  <p:childTnLst>
+                                    <p:set>
+                                      <p:cBhvr>
+                                        <p:cTn id="10" dur="1" fill="hold">
+                                          <p:stCondLst>
+                                            <p:cond delay="0"/>
+                                          </p:stCondLst>
+                                        </p:cTn>
+                                        <p:tgtEl>
+                                          <p:spTgt spid="3">
+                                            <p:txEl>
+                                              <p:pRg st="4" end="4"/>
+                                            </p:txEl>
+                                          </p:spTgt>
+                                        </p:tgtEl>
+                                        <p:attrNameLst>
+                                          <p:attrName>style.visibility</p:attrName>
+                                        </p:attrNameLst>
+                                      </p:cBhvr>
+                                      <p:to>
+                                        <p:strVal val="visible"/>
+                                      </p:to>
+                                    </p:set>
+                                  </p:childTnLst>
+                                </p:cTn>
+                              </p:par>
+                            </p:childTnLst>
+                          </p:cTn>
+                        </p:par>
+                      </p:childTnLst>
+                    </p:cTn>
+                  </p:par>
+                  <p:par>
+                    <p:cTn id="11" fill="hold">
+                      <p:stCondLst>
+                        <p:cond delay="indefinite"/>
+                      </p:stCondLst>
+                      <p:childTnLst>
+                        <p:par>
+                          <p:cTn id="12" fill="hold">
+                            <p:stCondLst>
+                              <p:cond delay="0"/>
+                            </p:stCondLst>
+                            <p:childTnLst>
+                              <p:par>
+                                <p:cTn id="13" presetID="1" presetClass="entr" presetSubtype="0" fill="hold" grpId="0" nodeType="clickEffect">
+                                  <p:stCondLst>
+                                    <p:cond delay="0"/>
+                                  </p:stCondLst>
+                                  <p:childTnLst>
+                                    <p:set>
+                                      <p:cBhvr>
+                                        <p:cTn id="14" dur="1" fill="hold">
+                                          <p:stCondLst>
+                                            <p:cond delay="0"/>
+                                          </p:stCondLst>
+                                        </p:cTn>
+                                        <p:tgtEl>
+                                          <p:spTgt spid="3">
+                                            <p:txEl>
+                                              <p:pRg st="5" end="5"/>
+                                            </p:txEl>
+                                          </p:spTgt>
+                                        </p:tgtEl>
+                                        <p:attrNameLst>
+                                          <p:attrName>style.visibility</p:attrName>
+                                        </p:attrNameLst>
+                                      </p:cBhvr>
+                                      <p:to>
+                                        <p:strVal val="visible"/>
+                                      </p:to>
+                                    </p:set>
+                                  </p:childTnLst>
+                                </p:cTn>
+                              </p:par>
+                            </p:childTnLst>
+                          </p:cTn>
+                        </p:par>
+                      </p:childTnLst>
+                    </p:cTn>
+                  </p:par>
+                </p:childTnLst>
+              </p:cTn>
+              <p:prevCondLst>
+                <p:cond evt="onPrev" delay="0">
+                  <p:tgtEl>
+                    <p:sldTgt/>
+                  </p:tgtEl>
+                </p:cond>
+              </p:prevCondLst>
+              <p:nextCondLst>
+                <p:cond evt="onNext" delay="0">
+                  <p:tgtEl>
+                    <p:sldTgt/>
+                  </p:tgtEl>
+                </p:cond>
+              </p:nextCondLst>
+            </p:seq>
+          </p:childTnLst>
+        </p:cTn>
+      </p:par>
+    </p:tnLst>
+    <p:bldLst>
+      <p:bldP spid="3" grpId="0" uiExpand="1" build="p"/>
+    </p:bldLst>
+  </p:timing>
 </p:sld>
 </file>
 
@@ -12141,7 +12320,7 @@
             <a:pPr lvl="0"/>
             <a:r>
               <a:rPr/>
-              <a:t>Next week, there are unfortuantely no statistics! 😭</a:t>
+              <a:t>Next week, there are unfortunately no statistics! 😭</a:t>
             </a:r>
           </a:p>
           <a:p>

</xml_diff>